<commit_message>
docs: fix typo in presentation
</commit_message>
<xml_diff>
--- a/.attachments/bottiesittely.pptx
+++ b/.attachments/bottiesittely.pptx
@@ -13570,7 +13570,7 @@
             </a:pPr>
             <a:r>
               <a:rPr lang="fi-FI" sz="1400" dirty="0"/>
-              <a:t>100 kieltä ymmärtävä monikielinen ”</a:t>
+              <a:t>109 kieltä ymmärtävä monikielinen ”</a:t>
             </a:r>
             <a:r>
               <a:rPr lang="fi-FI" sz="1400" dirty="0" err="1"/>
@@ -14001,7 +14001,7 @@
             </a:pPr>
             <a:r>
               <a:rPr lang="fi-FI" dirty="0"/>
-              <a:t>”Perinteiset” </a:t>
+              <a:t>Perinteiset </a:t>
             </a:r>
             <a:r>
               <a:rPr lang="fi-FI" dirty="0" err="1"/>
@@ -14018,12 +14018,16 @@
               <a:buChar char="•"/>
             </a:pPr>
             <a:r>
+              <a:rPr lang="fi-FI" dirty="0"/>
+              <a:t>Perinteinen </a:t>
+            </a:r>
+            <a:r>
               <a:rPr lang="fi-FI" dirty="0" err="1"/>
-              <a:t>OuluBotille</a:t>
+              <a:t>botti</a:t>
             </a:r>
             <a:r>
               <a:rPr lang="fi-FI" dirty="0"/>
-              <a:t> ”haluan uimaan” on vieras tilanne, Kunta-Katille se taas on opetettu.</a:t>
+              <a:t> ymmärtää vain tilanteet ja viestit, jotka sille on erikseen opetettu.</a:t>
             </a:r>
           </a:p>
           <a:p>
@@ -17290,6 +17294,47 @@
 </file>
 
 <file path=customXml/item1.xml><?xml version="1.0" encoding="utf-8"?>
+<?mso-contentType ?>
+<FormTemplates xmlns="http://schemas.microsoft.com/sharepoint/v3/contenttype/forms">
+  <Display>DocumentLibraryForm</Display>
+  <Edit>DocumentLibraryForm</Edit>
+  <New>DocumentLibraryForm</New>
+</FormTemplates>
+</file>
+
+<file path=customXml/item2.xml><?xml version="1.0" encoding="utf-8"?>
+<p:properties xmlns:p="http://schemas.microsoft.com/office/2006/metadata/properties" xmlns:xsi="http://www.w3.org/2001/XMLSchema-instance" xmlns:pc="http://schemas.microsoft.com/office/infopath/2007/PartnerControls">
+  <documentManagement>
+    <TaxCatchAll xmlns="e7cec6d4-5c21-44be-9e72-6358b36a74ba"/>
+    <dt_matrixTaxHTField0 xmlns="b51b029e-7687-4824-8a82-46a9cd3acc97">
+      <Terms xmlns="http://schemas.microsoft.com/office/infopath/2007/PartnerControls"/>
+    </dt_matrixTaxHTField0>
+    <dt_businesssectorTaxHTField0 xmlns="b51b029e-7687-4824-8a82-46a9cd3acc97">
+      <Terms xmlns="http://schemas.microsoft.com/office/infopath/2007/PartnerControls"/>
+    </dt_businesssectorTaxHTField0>
+    <dt_unitTaxHTField0 xmlns="b51b029e-7687-4824-8a82-46a9cd3acc97">
+      <Terms xmlns="http://schemas.microsoft.com/office/infopath/2007/PartnerControls"/>
+    </dt_unitTaxHTField0>
+    <dt_categoryTaxHTField0 xmlns="b51b029e-7687-4824-8a82-46a9cd3acc97">
+      <Terms xmlns="http://schemas.microsoft.com/office/infopath/2007/PartnerControls"/>
+    </dt_categoryTaxHTField0>
+    <dt_roleTaxHTField0 xmlns="cd8e1b10-1da4-4949-a988-619bffbdd903">
+      <Terms xmlns="http://schemas.microsoft.com/office/infopath/2007/PartnerControls"/>
+    </dt_roleTaxHTField0>
+    <dt_description xmlns="b51b029e-7687-4824-8a82-46a9cd3acc97" xsi:nil="true"/>
+    <PublishingExpirationDate xmlns="http://schemas.microsoft.com/sharepoint/v3" xsi:nil="true"/>
+    <dt_officeTaxHTField0 xmlns="b51b029e-7687-4824-8a82-46a9cd3acc97">
+      <Terms xmlns="http://schemas.microsoft.com/office/infopath/2007/PartnerControls"/>
+    </dt_officeTaxHTField0>
+    <PublishingStartDate xmlns="http://schemas.microsoft.com/sharepoint/v3" xsi:nil="true"/>
+    <dt_keywordTaxHTField0 xmlns="b51b029e-7687-4824-8a82-46a9cd3acc97">
+      <Terms xmlns="http://schemas.microsoft.com/office/infopath/2007/PartnerControls"/>
+    </dt_keywordTaxHTField0>
+  </documentManagement>
+</p:properties>
+</file>
+
+<file path=customXml/item3.xml><?xml version="1.0" encoding="utf-8"?>
 <ct:contentTypeSchema xmlns:ct="http://schemas.microsoft.com/office/2006/metadata/contentType" xmlns:ma="http://schemas.microsoft.com/office/2006/metadata/properties/metaAttributes" ct:_="" ma:_="" ma:contentTypeName="Asiakirja" ma:contentTypeID="0x0101006A9D3E947B4C3D4292005A5D3BAE4D3C" ma:contentTypeVersion="17" ma:contentTypeDescription="Luo uusi asiakirja." ma:contentTypeScope="" ma:versionID="527fe94b104a63788e9a9ceba35f1cfb">
   <xsd:schema xmlns:xsd="http://www.w3.org/2001/XMLSchema" xmlns:xs="http://www.w3.org/2001/XMLSchema" xmlns:p="http://schemas.microsoft.com/office/2006/metadata/properties" xmlns:ns1="http://schemas.microsoft.com/sharepoint/v3" xmlns:ns2="b51b029e-7687-4824-8a82-46a9cd3acc97" xmlns:ns3="e7cec6d4-5c21-44be-9e72-6358b36a74ba" xmlns:ns4="cd8e1b10-1da4-4949-a988-619bffbdd903" targetNamespace="http://schemas.microsoft.com/office/2006/metadata/properties" ma:root="true" ma:fieldsID="f0929de3a121c7fb613eace5f490d95d" ns1:_="" ns2:_="" ns3:_="" ns4:_="">
     <xsd:import namespace="http://schemas.microsoft.com/sharepoint/v3"/>
@@ -17512,64 +17557,10 @@
 </ct:contentTypeSchema>
 </file>
 
-<file path=customXml/item2.xml><?xml version="1.0" encoding="utf-8"?>
-<p:properties xmlns:p="http://schemas.microsoft.com/office/2006/metadata/properties" xmlns:xsi="http://www.w3.org/2001/XMLSchema-instance" xmlns:pc="http://schemas.microsoft.com/office/infopath/2007/PartnerControls">
-  <documentManagement>
-    <TaxCatchAll xmlns="e7cec6d4-5c21-44be-9e72-6358b36a74ba"/>
-    <dt_matrixTaxHTField0 xmlns="b51b029e-7687-4824-8a82-46a9cd3acc97">
-      <Terms xmlns="http://schemas.microsoft.com/office/infopath/2007/PartnerControls"/>
-    </dt_matrixTaxHTField0>
-    <dt_businesssectorTaxHTField0 xmlns="b51b029e-7687-4824-8a82-46a9cd3acc97">
-      <Terms xmlns="http://schemas.microsoft.com/office/infopath/2007/PartnerControls"/>
-    </dt_businesssectorTaxHTField0>
-    <dt_unitTaxHTField0 xmlns="b51b029e-7687-4824-8a82-46a9cd3acc97">
-      <Terms xmlns="http://schemas.microsoft.com/office/infopath/2007/PartnerControls"/>
-    </dt_unitTaxHTField0>
-    <dt_categoryTaxHTField0 xmlns="b51b029e-7687-4824-8a82-46a9cd3acc97">
-      <Terms xmlns="http://schemas.microsoft.com/office/infopath/2007/PartnerControls"/>
-    </dt_categoryTaxHTField0>
-    <dt_roleTaxHTField0 xmlns="cd8e1b10-1da4-4949-a988-619bffbdd903">
-      <Terms xmlns="http://schemas.microsoft.com/office/infopath/2007/PartnerControls"/>
-    </dt_roleTaxHTField0>
-    <dt_description xmlns="b51b029e-7687-4824-8a82-46a9cd3acc97" xsi:nil="true"/>
-    <PublishingExpirationDate xmlns="http://schemas.microsoft.com/sharepoint/v3" xsi:nil="true"/>
-    <dt_officeTaxHTField0 xmlns="b51b029e-7687-4824-8a82-46a9cd3acc97">
-      <Terms xmlns="http://schemas.microsoft.com/office/infopath/2007/PartnerControls"/>
-    </dt_officeTaxHTField0>
-    <PublishingStartDate xmlns="http://schemas.microsoft.com/sharepoint/v3" xsi:nil="true"/>
-    <dt_keywordTaxHTField0 xmlns="b51b029e-7687-4824-8a82-46a9cd3acc97">
-      <Terms xmlns="http://schemas.microsoft.com/office/infopath/2007/PartnerControls"/>
-    </dt_keywordTaxHTField0>
-  </documentManagement>
-</p:properties>
-</file>
-
-<file path=customXml/item3.xml><?xml version="1.0" encoding="utf-8"?>
-<?mso-contentType ?>
-<FormTemplates xmlns="http://schemas.microsoft.com/sharepoint/v3/contenttype/forms">
-  <Display>DocumentLibraryForm</Display>
-  <Edit>DocumentLibraryForm</Edit>
-  <New>DocumentLibraryForm</New>
-</FormTemplates>
-</file>
-
 <file path=customXml/itemProps1.xml><?xml version="1.0" encoding="utf-8"?>
-<ds:datastoreItem xmlns:ds="http://schemas.openxmlformats.org/officeDocument/2006/customXml" ds:itemID="{D217CBC8-954C-49BC-8B0D-D89BA34B0A9F}">
+<ds:datastoreItem xmlns:ds="http://schemas.openxmlformats.org/officeDocument/2006/customXml" ds:itemID="{2A1BEEA7-9FE3-4AF7-9243-C46B5DE08EC3}">
   <ds:schemaRefs>
-    <ds:schemaRef ds:uri="b51b029e-7687-4824-8a82-46a9cd3acc97"/>
-    <ds:schemaRef ds:uri="cd8e1b10-1da4-4949-a988-619bffbdd903"/>
-    <ds:schemaRef ds:uri="e7cec6d4-5c21-44be-9e72-6358b36a74ba"/>
-    <ds:schemaRef ds:uri="http://purl.org/dc/elements/1.1/"/>
-    <ds:schemaRef ds:uri="http://purl.org/dc/terms/"/>
-    <ds:schemaRef ds:uri="http://schemas.microsoft.com/internal/obd"/>
-    <ds:schemaRef ds:uri="http://schemas.microsoft.com/office/2006/documentManagement/types"/>
-    <ds:schemaRef ds:uri="http://schemas.microsoft.com/office/2006/metadata/contentType"/>
-    <ds:schemaRef ds:uri="http://schemas.microsoft.com/office/2006/metadata/properties"/>
-    <ds:schemaRef ds:uri="http://schemas.microsoft.com/office/2006/metadata/properties/metaAttributes"/>
-    <ds:schemaRef ds:uri="http://schemas.microsoft.com/office/infopath/2007/PartnerControls"/>
-    <ds:schemaRef ds:uri="http://schemas.microsoft.com/sharepoint/v3"/>
-    <ds:schemaRef ds:uri="http://schemas.openxmlformats.org/package/2006/metadata/core-properties"/>
-    <ds:schemaRef ds:uri="http://www.w3.org/2001/XMLSchema"/>
+    <ds:schemaRef ds:uri="http://schemas.microsoft.com/sharepoint/v3/contenttype/forms"/>
   </ds:schemaRefs>
 </ds:datastoreItem>
 </file>
@@ -17596,9 +17587,22 @@
 </file>
 
 <file path=customXml/itemProps3.xml><?xml version="1.0" encoding="utf-8"?>
-<ds:datastoreItem xmlns:ds="http://schemas.openxmlformats.org/officeDocument/2006/customXml" ds:itemID="{2A1BEEA7-9FE3-4AF7-9243-C46B5DE08EC3}">
+<ds:datastoreItem xmlns:ds="http://schemas.openxmlformats.org/officeDocument/2006/customXml" ds:itemID="{D217CBC8-954C-49BC-8B0D-D89BA34B0A9F}">
   <ds:schemaRefs>
-    <ds:schemaRef ds:uri="http://schemas.microsoft.com/sharepoint/v3/contenttype/forms"/>
+    <ds:schemaRef ds:uri="b51b029e-7687-4824-8a82-46a9cd3acc97"/>
+    <ds:schemaRef ds:uri="cd8e1b10-1da4-4949-a988-619bffbdd903"/>
+    <ds:schemaRef ds:uri="e7cec6d4-5c21-44be-9e72-6358b36a74ba"/>
+    <ds:schemaRef ds:uri="http://purl.org/dc/elements/1.1/"/>
+    <ds:schemaRef ds:uri="http://purl.org/dc/terms/"/>
+    <ds:schemaRef ds:uri="http://schemas.microsoft.com/internal/obd"/>
+    <ds:schemaRef ds:uri="http://schemas.microsoft.com/office/2006/documentManagement/types"/>
+    <ds:schemaRef ds:uri="http://schemas.microsoft.com/office/2006/metadata/contentType"/>
+    <ds:schemaRef ds:uri="http://schemas.microsoft.com/office/2006/metadata/properties"/>
+    <ds:schemaRef ds:uri="http://schemas.microsoft.com/office/2006/metadata/properties/metaAttributes"/>
+    <ds:schemaRef ds:uri="http://schemas.microsoft.com/office/infopath/2007/PartnerControls"/>
+    <ds:schemaRef ds:uri="http://schemas.microsoft.com/sharepoint/v3"/>
+    <ds:schemaRef ds:uri="http://schemas.openxmlformats.org/package/2006/metadata/core-properties"/>
+    <ds:schemaRef ds:uri="http://www.w3.org/2001/XMLSchema"/>
   </ds:schemaRefs>
 </ds:datastoreItem>
 </file>
</xml_diff>